<commit_message>
added writeup and PPT
</commit_message>
<xml_diff>
--- a/presentation/Presentation2.pptx
+++ b/presentation/Presentation2.pptx
@@ -7,8 +7,8 @@
   <p:sldIdLst>
     <p:sldId id="256" r:id="rId2"/>
     <p:sldId id="264" r:id="rId3"/>
-    <p:sldId id="266" r:id="rId4"/>
-    <p:sldId id="257" r:id="rId5"/>
+    <p:sldId id="257" r:id="rId4"/>
+    <p:sldId id="266" r:id="rId5"/>
     <p:sldId id="259" r:id="rId6"/>
     <p:sldId id="262" r:id="rId7"/>
     <p:sldId id="265" r:id="rId8"/>
@@ -18,7 +18,8 @@
     <p:sldId id="258" r:id="rId12"/>
     <p:sldId id="261" r:id="rId13"/>
     <p:sldId id="260" r:id="rId14"/>
-    <p:sldId id="270" r:id="rId15"/>
+    <p:sldId id="271" r:id="rId15"/>
+    <p:sldId id="270" r:id="rId16"/>
   </p:sldIdLst>
   <p:sldSz cx="12192000" cy="6858000"/>
   <p:notesSz cx="6858000" cy="9144000"/>
@@ -272,7 +273,7 @@
           <a:p>
             <a:fld id="{60A75851-D58E-4D45-B7FD-728F0A4A5AE9}" type="datetimeFigureOut">
               <a:rPr lang="en-US" smtClean="0"/>
-              <a:t>5/2/2023</a:t>
+              <a:t>5/2/23</a:t>
             </a:fld>
             <a:endParaRPr lang="en-US"/>
           </a:p>
@@ -470,7 +471,7 @@
           <a:p>
             <a:fld id="{60A75851-D58E-4D45-B7FD-728F0A4A5AE9}" type="datetimeFigureOut">
               <a:rPr lang="en-US" smtClean="0"/>
-              <a:t>5/2/2023</a:t>
+              <a:t>5/2/23</a:t>
             </a:fld>
             <a:endParaRPr lang="en-US"/>
           </a:p>
@@ -678,7 +679,7 @@
           <a:p>
             <a:fld id="{60A75851-D58E-4D45-B7FD-728F0A4A5AE9}" type="datetimeFigureOut">
               <a:rPr lang="en-US" smtClean="0"/>
-              <a:t>5/2/2023</a:t>
+              <a:t>5/2/23</a:t>
             </a:fld>
             <a:endParaRPr lang="en-US"/>
           </a:p>
@@ -876,7 +877,7 @@
           <a:p>
             <a:fld id="{60A75851-D58E-4D45-B7FD-728F0A4A5AE9}" type="datetimeFigureOut">
               <a:rPr lang="en-US" smtClean="0"/>
-              <a:t>5/2/2023</a:t>
+              <a:t>5/2/23</a:t>
             </a:fld>
             <a:endParaRPr lang="en-US"/>
           </a:p>
@@ -1151,7 +1152,7 @@
           <a:p>
             <a:fld id="{60A75851-D58E-4D45-B7FD-728F0A4A5AE9}" type="datetimeFigureOut">
               <a:rPr lang="en-US" smtClean="0"/>
-              <a:t>5/2/2023</a:t>
+              <a:t>5/2/23</a:t>
             </a:fld>
             <a:endParaRPr lang="en-US"/>
           </a:p>
@@ -1416,7 +1417,7 @@
           <a:p>
             <a:fld id="{60A75851-D58E-4D45-B7FD-728F0A4A5AE9}" type="datetimeFigureOut">
               <a:rPr lang="en-US" smtClean="0"/>
-              <a:t>5/2/2023</a:t>
+              <a:t>5/2/23</a:t>
             </a:fld>
             <a:endParaRPr lang="en-US"/>
           </a:p>
@@ -1828,7 +1829,7 @@
           <a:p>
             <a:fld id="{60A75851-D58E-4D45-B7FD-728F0A4A5AE9}" type="datetimeFigureOut">
               <a:rPr lang="en-US" smtClean="0"/>
-              <a:t>5/2/2023</a:t>
+              <a:t>5/2/23</a:t>
             </a:fld>
             <a:endParaRPr lang="en-US"/>
           </a:p>
@@ -1969,7 +1970,7 @@
           <a:p>
             <a:fld id="{60A75851-D58E-4D45-B7FD-728F0A4A5AE9}" type="datetimeFigureOut">
               <a:rPr lang="en-US" smtClean="0"/>
-              <a:t>5/2/2023</a:t>
+              <a:t>5/2/23</a:t>
             </a:fld>
             <a:endParaRPr lang="en-US"/>
           </a:p>
@@ -2082,7 +2083,7 @@
           <a:p>
             <a:fld id="{60A75851-D58E-4D45-B7FD-728F0A4A5AE9}" type="datetimeFigureOut">
               <a:rPr lang="en-US" smtClean="0"/>
-              <a:t>5/2/2023</a:t>
+              <a:t>5/2/23</a:t>
             </a:fld>
             <a:endParaRPr lang="en-US"/>
           </a:p>
@@ -2393,7 +2394,7 @@
           <a:p>
             <a:fld id="{60A75851-D58E-4D45-B7FD-728F0A4A5AE9}" type="datetimeFigureOut">
               <a:rPr lang="en-US" smtClean="0"/>
-              <a:t>5/2/2023</a:t>
+              <a:t>5/2/23</a:t>
             </a:fld>
             <a:endParaRPr lang="en-US"/>
           </a:p>
@@ -2681,7 +2682,7 @@
           <a:p>
             <a:fld id="{60A75851-D58E-4D45-B7FD-728F0A4A5AE9}" type="datetimeFigureOut">
               <a:rPr lang="en-US" smtClean="0"/>
-              <a:t>5/2/2023</a:t>
+              <a:t>5/2/23</a:t>
             </a:fld>
             <a:endParaRPr lang="en-US"/>
           </a:p>
@@ -2922,7 +2923,7 @@
           <a:p>
             <a:fld id="{60A75851-D58E-4D45-B7FD-728F0A4A5AE9}" type="datetimeFigureOut">
               <a:rPr lang="en-US" smtClean="0"/>
-              <a:t>5/2/2023</a:t>
+              <a:t>5/2/23</a:t>
             </a:fld>
             <a:endParaRPr lang="en-US"/>
           </a:p>
@@ -3554,7 +3555,7 @@
         </p:blipFill>
         <p:spPr bwMode="auto">
           <a:xfrm>
-            <a:off x="0" y="2573477"/>
+            <a:off x="0" y="3113359"/>
             <a:ext cx="12192000" cy="2984500"/>
           </a:xfrm>
           <a:prstGeom prst="rect">
@@ -3588,7 +3589,7 @@
         </p:nvSpPr>
         <p:spPr bwMode="auto">
           <a:xfrm>
-            <a:off x="347472" y="2388811"/>
+            <a:off x="347472" y="2658380"/>
             <a:ext cx="12886481" cy="184666"/>
           </a:xfrm>
           <a:prstGeom prst="rect">
@@ -3660,7 +3661,7 @@
                 <a:latin typeface="Arial Unicode MS"/>
                 <a:ea typeface="Courier New" panose="02070309020205020404" pitchFamily="49" charset="0"/>
               </a:rPr>
-              <a:t> </a:t>
+              <a:t>', </a:t>
             </a:r>
             <a:r>
               <a:rPr kumimoji="0" lang="en-US" altLang="en-US" sz="1200" b="0" i="0" u="none" strike="noStrike" cap="none" normalizeH="0" baseline="0" dirty="0">
@@ -3967,6 +3968,76 @@
               <a:effectLst/>
               <a:latin typeface="Arial" panose="020B0604020202020204" pitchFamily="34" charset="0"/>
             </a:endParaRPr>
+          </a:p>
+        </p:txBody>
+      </p:sp>
+      <p:sp>
+        <p:nvSpPr>
+          <p:cNvPr id="2" name="TextBox 1">
+            <a:extLst>
+              <a:ext uri="{FF2B5EF4-FFF2-40B4-BE49-F238E27FC236}">
+                <a16:creationId xmlns:a16="http://schemas.microsoft.com/office/drawing/2014/main" id="{01A353B7-3ACB-B309-F793-C06ECA4DFA84}"/>
+              </a:ext>
+            </a:extLst>
+          </p:cNvPr>
+          <p:cNvSpPr txBox="1"/>
+          <p:nvPr/>
+        </p:nvSpPr>
+        <p:spPr>
+          <a:xfrm>
+            <a:off x="509726" y="1288243"/>
+            <a:ext cx="10050529" cy="369332"/>
+          </a:xfrm>
+          <a:prstGeom prst="rect">
+            <a:avLst/>
+          </a:prstGeom>
+          <a:noFill/>
+        </p:spPr>
+        <p:txBody>
+          <a:bodyPr wrap="square" rtlCol="0">
+            <a:spAutoFit/>
+          </a:bodyPr>
+          <a:lstStyle/>
+          <a:p>
+            <a:r>
+              <a:rPr lang="en-US" dirty="0"/>
+              <a:t>We found the 3 top performing stocks for each sector and graphed their percentage growth</a:t>
+            </a:r>
+          </a:p>
+        </p:txBody>
+      </p:sp>
+      <p:sp>
+        <p:nvSpPr>
+          <p:cNvPr id="5" name="TextBox 4">
+            <a:extLst>
+              <a:ext uri="{FF2B5EF4-FFF2-40B4-BE49-F238E27FC236}">
+                <a16:creationId xmlns:a16="http://schemas.microsoft.com/office/drawing/2014/main" id="{269AD774-9741-08FC-A48C-A7BBDD393D8D}"/>
+              </a:ext>
+            </a:extLst>
+          </p:cNvPr>
+          <p:cNvSpPr txBox="1"/>
+          <p:nvPr/>
+        </p:nvSpPr>
+        <p:spPr>
+          <a:xfrm>
+            <a:off x="509726" y="1700027"/>
+            <a:ext cx="11030442" cy="646331"/>
+          </a:xfrm>
+          <a:prstGeom prst="rect">
+            <a:avLst/>
+          </a:prstGeom>
+          <a:noFill/>
+        </p:spPr>
+        <p:txBody>
+          <a:bodyPr wrap="square" rtlCol="0">
+            <a:spAutoFit/>
+          </a:bodyPr>
+          <a:lstStyle/>
+          <a:p>
+            <a:r>
+              <a:rPr lang="en-US" dirty="0"/>
+              <a:t>The weight of some of these top movers was small relative to the rest of the fund. ENPH has a weight of 0.088% in the S&amp;P 500</a:t>
+            </a:r>
           </a:p>
         </p:txBody>
       </p:sp>
@@ -4023,13 +4094,11 @@
           </a:xfrm>
         </p:spPr>
         <p:txBody>
-          <a:bodyPr>
-            <a:normAutofit/>
-          </a:bodyPr>
-          <a:lstStyle/>
-          <a:p>
-            <a:r>
-              <a:rPr lang="en-US" sz="5400" b="1" dirty="0"/>
+          <a:bodyPr/>
+          <a:lstStyle/>
+          <a:p>
+            <a:r>
+              <a:rPr lang="en-US" dirty="0"/>
               <a:t>Industry Stability</a:t>
             </a:r>
           </a:p>
@@ -4074,13 +4143,33 @@
             </a:r>
             <a:r>
               <a:rPr lang="en-US" sz="2400" kern="100" dirty="0">
-                <a:effectLst/>
                 <a:latin typeface="Calibri" panose="020F0502020204030204" pitchFamily="34" charset="0"/>
                 <a:ea typeface="DengXian" panose="02010600030101010101" pitchFamily="2" charset="-122"/>
                 <a:cs typeface="Times New Roman" panose="02020603050405020304" pitchFamily="18" charset="0"/>
               </a:rPr>
-              <a:t>Examine the average earnings stability of companies within the industry by looking at historical earnings growth or the variability of earnings. A stable industry will typically have companies with more consistent earnings growth or less variability in earnings.</a:t>
-            </a:r>
+              <a:t>We didn’t find historical earnings data for each of these companies, but if we had we could have have analyzed this data further with a profit and earnings analysis to see which sector is expected to grow the most going forward. We could have used this information to better inform decisions about how one should invest given their risk tolerance</a:t>
+            </a:r>
+          </a:p>
+          <a:p>
+            <a:pPr marL="0" indent="0">
+              <a:buNone/>
+            </a:pPr>
+            <a:endParaRPr lang="en-US" sz="2400" b="1" kern="100" dirty="0">
+              <a:effectLst/>
+              <a:latin typeface="Calibri" panose="020F0502020204030204" pitchFamily="34" charset="0"/>
+              <a:ea typeface="DengXian" panose="02010600030101010101" pitchFamily="2" charset="-122"/>
+              <a:cs typeface="Times New Roman" panose="02020603050405020304" pitchFamily="18" charset="0"/>
+            </a:endParaRPr>
+          </a:p>
+          <a:p>
+            <a:pPr marL="0" indent="0">
+              <a:buNone/>
+            </a:pPr>
+            <a:endParaRPr lang="en-US" sz="2400" b="1" kern="100" dirty="0">
+              <a:latin typeface="Calibri" panose="020F0502020204030204" pitchFamily="34" charset="0"/>
+              <a:ea typeface="DengXian" panose="02010600030101010101" pitchFamily="2" charset="-122"/>
+              <a:cs typeface="Times New Roman" panose="02020603050405020304" pitchFamily="18" charset="0"/>
+            </a:endParaRPr>
           </a:p>
           <a:p>
             <a:r>
@@ -4089,8 +4178,21 @@
                 <a:ea typeface="DengXian" panose="02010600030101010101" pitchFamily="2" charset="-122"/>
                 <a:cs typeface="Times New Roman" panose="02020603050405020304" pitchFamily="18" charset="0"/>
               </a:rPr>
-              <a:t>Moving Stability</a:t>
-            </a:r>
+              <a:t>Moving Stability: </a:t>
+            </a:r>
+            <a:r>
+              <a:rPr lang="en-US" sz="2400" kern="100" dirty="0">
+                <a:latin typeface="Calibri" panose="020F0502020204030204" pitchFamily="34" charset="0"/>
+                <a:ea typeface="DengXian" panose="02010600030101010101" pitchFamily="2" charset="-122"/>
+                <a:cs typeface="Times New Roman" panose="02020603050405020304" pitchFamily="18" charset="0"/>
+              </a:rPr>
+              <a:t>We did analyze the in-year volatility of stock prices by comparing how much each stock changed within a given year. This isn’t as effective of a measure as an Earnings Stability report but it’s better than nothing</a:t>
+            </a:r>
+          </a:p>
+          <a:p>
+            <a:pPr marL="0" indent="0">
+              <a:buNone/>
+            </a:pPr>
             <a:endParaRPr lang="en-US" kern="100" dirty="0">
               <a:effectLst/>
               <a:latin typeface="Calibri" panose="020F0502020204030204" pitchFamily="34" charset="0"/>
@@ -4191,14 +4293,49 @@
         </p:blipFill>
         <p:spPr>
           <a:xfrm>
-            <a:off x="1056951" y="1690688"/>
-            <a:ext cx="8836703" cy="4753992"/>
+            <a:off x="1056951" y="2129219"/>
+            <a:ext cx="8836703" cy="4363656"/>
           </a:xfrm>
           <a:prstGeom prst="rect">
             <a:avLst/>
           </a:prstGeom>
         </p:spPr>
       </p:pic>
+      <p:sp>
+        <p:nvSpPr>
+          <p:cNvPr id="5" name="TextBox 4">
+            <a:extLst>
+              <a:ext uri="{FF2B5EF4-FFF2-40B4-BE49-F238E27FC236}">
+                <a16:creationId xmlns:a16="http://schemas.microsoft.com/office/drawing/2014/main" id="{0DE009D3-393A-1E5E-66DE-19C9EF1611A3}"/>
+              </a:ext>
+            </a:extLst>
+          </p:cNvPr>
+          <p:cNvSpPr txBox="1"/>
+          <p:nvPr/>
+        </p:nvSpPr>
+        <p:spPr>
+          <a:xfrm>
+            <a:off x="758618" y="1506022"/>
+            <a:ext cx="9433367" cy="369332"/>
+          </a:xfrm>
+          <a:prstGeom prst="rect">
+            <a:avLst/>
+          </a:prstGeom>
+          <a:noFill/>
+        </p:spPr>
+        <p:txBody>
+          <a:bodyPr wrap="square" rtlCol="0">
+            <a:spAutoFit/>
+          </a:bodyPr>
+          <a:lstStyle/>
+          <a:p>
+            <a:r>
+              <a:rPr lang="en-US" dirty="0"/>
+              <a:t>The returns of some sectors are clearly more stable than those of other industries</a:t>
+            </a:r>
+          </a:p>
+        </p:txBody>
+      </p:sp>
     </p:spTree>
     <p:extLst>
       <p:ext uri="{BB962C8B-B14F-4D97-AF65-F5344CB8AC3E}">
@@ -4284,7 +4421,7 @@
         </p:blipFill>
         <p:spPr>
           <a:xfrm>
-            <a:off x="1903335" y="1528643"/>
+            <a:off x="1903335" y="1909452"/>
             <a:ext cx="8385330" cy="4594991"/>
           </a:xfrm>
           <a:prstGeom prst="rect">
@@ -4292,6 +4429,41 @@
           </a:prstGeom>
         </p:spPr>
       </p:pic>
+      <p:sp>
+        <p:nvSpPr>
+          <p:cNvPr id="5" name="TextBox 4">
+            <a:extLst>
+              <a:ext uri="{FF2B5EF4-FFF2-40B4-BE49-F238E27FC236}">
+                <a16:creationId xmlns:a16="http://schemas.microsoft.com/office/drawing/2014/main" id="{F35F265E-CE5A-DE80-6BE8-4DEFF21D6224}"/>
+              </a:ext>
+            </a:extLst>
+          </p:cNvPr>
+          <p:cNvSpPr txBox="1"/>
+          <p:nvPr/>
+        </p:nvSpPr>
+        <p:spPr>
+          <a:xfrm>
+            <a:off x="709915" y="1343977"/>
+            <a:ext cx="10204047" cy="369332"/>
+          </a:xfrm>
+          <a:prstGeom prst="rect">
+            <a:avLst/>
+          </a:prstGeom>
+          <a:noFill/>
+        </p:spPr>
+        <p:txBody>
+          <a:bodyPr wrap="square" rtlCol="0">
+            <a:spAutoFit/>
+          </a:bodyPr>
+          <a:lstStyle/>
+          <a:p>
+            <a:r>
+              <a:rPr lang="en-US" dirty="0"/>
+              <a:t>This graph shows the average percent difference between the in-year high and in-year low of each sector</a:t>
+            </a:r>
+          </a:p>
+        </p:txBody>
+      </p:sp>
     </p:spTree>
     <p:extLst>
       <p:ext uri="{BB962C8B-B14F-4D97-AF65-F5344CB8AC3E}">
@@ -4327,6 +4499,146 @@
           <p:cNvPr id="2" name="Title 1">
             <a:extLst>
               <a:ext uri="{FF2B5EF4-FFF2-40B4-BE49-F238E27FC236}">
+                <a16:creationId xmlns:a16="http://schemas.microsoft.com/office/drawing/2014/main" id="{2C4E14B9-39B0-0676-4E7D-5D4FD5DC6C3F}"/>
+              </a:ext>
+            </a:extLst>
+          </p:cNvPr>
+          <p:cNvSpPr>
+            <a:spLocks noGrp="1"/>
+          </p:cNvSpPr>
+          <p:nvPr>
+            <p:ph type="title"/>
+          </p:nvPr>
+        </p:nvSpPr>
+        <p:spPr/>
+        <p:txBody>
+          <a:bodyPr/>
+          <a:lstStyle/>
+          <a:p>
+            <a:r>
+              <a:rPr lang="en-US" dirty="0"/>
+              <a:t>Questions 1 &amp; 2</a:t>
+            </a:r>
+          </a:p>
+        </p:txBody>
+      </p:sp>
+      <p:sp>
+        <p:nvSpPr>
+          <p:cNvPr id="3" name="Content Placeholder 2">
+            <a:extLst>
+              <a:ext uri="{FF2B5EF4-FFF2-40B4-BE49-F238E27FC236}">
+                <a16:creationId xmlns:a16="http://schemas.microsoft.com/office/drawing/2014/main" id="{359F15EF-BEC4-BB81-8C29-EDF4F18BD2C1}"/>
+              </a:ext>
+            </a:extLst>
+          </p:cNvPr>
+          <p:cNvSpPr>
+            <a:spLocks noGrp="1"/>
+          </p:cNvSpPr>
+          <p:nvPr>
+            <p:ph idx="1"/>
+          </p:nvPr>
+        </p:nvSpPr>
+        <p:spPr/>
+        <p:txBody>
+          <a:bodyPr/>
+          <a:lstStyle/>
+          <a:p>
+            <a:r>
+              <a:rPr lang="en-US" sz="2800" kern="100" dirty="0">
+                <a:effectLst/>
+                <a:latin typeface="Calibri" panose="020F0502020204030204" pitchFamily="34" charset="0"/>
+                <a:ea typeface="DengXian" panose="02010600030101010101" pitchFamily="2" charset="-122"/>
+                <a:cs typeface="Times New Roman" panose="02020603050405020304" pitchFamily="18" charset="0"/>
+              </a:rPr>
+              <a:t>Which sectors have experienced the most significant increase in stock prices over the past ten years?</a:t>
+            </a:r>
+          </a:p>
+          <a:p>
+            <a:pPr lvl="1"/>
+            <a:r>
+              <a:rPr lang="en-US" dirty="0"/>
+              <a:t>Information Technology, Healthcare, and Consumer Discretionary</a:t>
+            </a:r>
+          </a:p>
+          <a:p>
+            <a:endParaRPr lang="en-US" kern="100" dirty="0">
+              <a:latin typeface="Calibri" panose="020F0502020204030204" pitchFamily="34" charset="0"/>
+              <a:ea typeface="DengXian" panose="02010600030101010101" pitchFamily="2" charset="-122"/>
+              <a:cs typeface="Times New Roman" panose="02020603050405020304" pitchFamily="18" charset="0"/>
+            </a:endParaRPr>
+          </a:p>
+          <a:p>
+            <a:endParaRPr lang="en-US" sz="2800" kern="100" dirty="0">
+              <a:effectLst/>
+              <a:latin typeface="Calibri" panose="020F0502020204030204" pitchFamily="34" charset="0"/>
+              <a:ea typeface="DengXian" panose="02010600030101010101" pitchFamily="2" charset="-122"/>
+              <a:cs typeface="Times New Roman" panose="02020603050405020304" pitchFamily="18" charset="0"/>
+            </a:endParaRPr>
+          </a:p>
+          <a:p>
+            <a:r>
+              <a:rPr lang="en-US" sz="2800" kern="100" dirty="0">
+                <a:effectLst/>
+                <a:latin typeface="Calibri" panose="020F0502020204030204" pitchFamily="34" charset="0"/>
+                <a:ea typeface="DengXian" panose="02010600030101010101" pitchFamily="2" charset="-122"/>
+                <a:cs typeface="Times New Roman" panose="02020603050405020304" pitchFamily="18" charset="0"/>
+              </a:rPr>
+              <a:t>Which sectors have been the most stable in terms of stock price fluctuations over the past ten years?</a:t>
+            </a:r>
+          </a:p>
+          <a:p>
+            <a:pPr lvl="1"/>
+            <a:r>
+              <a:rPr lang="en-US" kern="100" dirty="0">
+                <a:effectLst/>
+                <a:latin typeface="Calibri" panose="020F0502020204030204" pitchFamily="34" charset="0"/>
+                <a:ea typeface="DengXian" panose="02010600030101010101" pitchFamily="2" charset="-122"/>
+                <a:cs typeface="Times New Roman" panose="02020603050405020304" pitchFamily="18" charset="0"/>
+              </a:rPr>
+              <a:t>Real Estate, Utilities, and Industrials</a:t>
+            </a:r>
+          </a:p>
+          <a:p>
+            <a:pPr lvl="1"/>
+            <a:endParaRPr lang="en-US" dirty="0"/>
+          </a:p>
+        </p:txBody>
+      </p:sp>
+    </p:spTree>
+    <p:extLst>
+      <p:ext uri="{BB962C8B-B14F-4D97-AF65-F5344CB8AC3E}">
+        <p14:creationId xmlns:p14="http://schemas.microsoft.com/office/powerpoint/2010/main" val="1157505565"/>
+      </p:ext>
+    </p:extLst>
+  </p:cSld>
+  <p:clrMapOvr>
+    <a:masterClrMapping/>
+  </p:clrMapOvr>
+</p:sld>
+</file>
+
+<file path=ppt/slides/slide15.xml><?xml version="1.0" encoding="utf-8"?>
+<p:sld xmlns:a="http://schemas.openxmlformats.org/drawingml/2006/main" xmlns:r="http://schemas.openxmlformats.org/officeDocument/2006/relationships" xmlns:p="http://schemas.openxmlformats.org/presentationml/2006/main">
+  <p:cSld>
+    <p:spTree>
+      <p:nvGrpSpPr>
+        <p:cNvPr id="1" name=""/>
+        <p:cNvGrpSpPr/>
+        <p:nvPr/>
+      </p:nvGrpSpPr>
+      <p:grpSpPr>
+        <a:xfrm>
+          <a:off x="0" y="0"/>
+          <a:ext cx="0" cy="0"/>
+          <a:chOff x="0" y="0"/>
+          <a:chExt cx="0" cy="0"/>
+        </a:xfrm>
+      </p:grpSpPr>
+      <p:sp>
+        <p:nvSpPr>
+          <p:cNvPr id="2" name="Title 1">
+            <a:extLst>
+              <a:ext uri="{FF2B5EF4-FFF2-40B4-BE49-F238E27FC236}">
                 <a16:creationId xmlns:a16="http://schemas.microsoft.com/office/drawing/2014/main" id="{BF2AB0C1-09F0-2AE7-F39A-58C30D53F700}"/>
               </a:ext>
             </a:extLst>
@@ -4343,7 +4655,10 @@
           <a:bodyPr/>
           <a:lstStyle/>
           <a:p>
-            <a:endParaRPr lang="en-US"/>
+            <a:r>
+              <a:rPr lang="en-US" dirty="0"/>
+              <a:t>Question 3</a:t>
+            </a:r>
           </a:p>
         </p:txBody>
       </p:sp>
@@ -4365,10 +4680,45 @@
         </p:nvSpPr>
         <p:spPr/>
         <p:txBody>
-          <a:bodyPr/>
-          <a:lstStyle/>
-          <a:p>
-            <a:endParaRPr lang="en-US"/>
+          <a:bodyPr>
+            <a:normAutofit/>
+          </a:bodyPr>
+          <a:lstStyle/>
+          <a:p>
+            <a:r>
+              <a:rPr lang="en-US" sz="2000" dirty="0"/>
+              <a:t>It seems that if you’re younger or a riskier investor and you’re looking for bigger returns on your investments, filling your portfolio with IT, Healthcare, Energy, and Consumer Discretionary stocks is a strategy you might want to employ</a:t>
+            </a:r>
+          </a:p>
+          <a:p>
+            <a:pPr marL="0" indent="0">
+              <a:buNone/>
+            </a:pPr>
+            <a:endParaRPr lang="en-US" sz="2000" dirty="0"/>
+          </a:p>
+          <a:p>
+            <a:r>
+              <a:rPr lang="en-US" sz="2000" dirty="0"/>
+              <a:t>If you’re a little older or you have a lower risk tolerance you might want to focus your investing towards the old school industries like Real Estate, Financials, Materials, Industrials, and Utilities. Those sectors tend not to bring the same high returns, but you’re unlikely to lose a lot of money within your portfolio.</a:t>
+            </a:r>
+          </a:p>
+          <a:p>
+            <a:endParaRPr lang="en-US" sz="2000" dirty="0"/>
+          </a:p>
+          <a:p>
+            <a:r>
+              <a:rPr lang="en-US" sz="2000" dirty="0"/>
+              <a:t>The most sound investment strategy would be to diversify across all of these sectors, that way you can benefit from the immense growth of the more volatile sectors and avoid losing a ton of money when those sectors have poor performing years.</a:t>
+            </a:r>
+          </a:p>
+          <a:p>
+            <a:endParaRPr lang="en-US" sz="2000" dirty="0"/>
+          </a:p>
+          <a:p>
+            <a:endParaRPr lang="en-US" sz="2000" dirty="0"/>
+          </a:p>
+          <a:p>
+            <a:endParaRPr lang="en-US" sz="2000" dirty="0"/>
           </a:p>
         </p:txBody>
       </p:sp>
@@ -4426,105 +4776,13 @@
         </p:spPr>
         <p:txBody>
           <a:bodyPr>
-            <a:normAutofit lnSpcReduction="10000"/>
+            <a:normAutofit/>
           </a:bodyPr>
           <a:lstStyle/>
           <a:p>
-            <a:pPr algn="l">
-              <a:buFont typeface="+mj-lt"/>
-              <a:buAutoNum type="arabicPeriod"/>
+            <a:pPr marL="0" indent="0" algn="l">
+              <a:buNone/>
             </a:pPr>
-            <a:r>
-              <a:rPr lang="en-US" b="0" i="0" dirty="0">
-                <a:solidFill>
-                  <a:srgbClr val="374151"/>
-                </a:solidFill>
-                <a:effectLst/>
-                <a:latin typeface="Söhne"/>
-              </a:rPr>
-              <a:t>Introduction:</a:t>
-            </a:r>
-          </a:p>
-          <a:p>
-            <a:pPr lvl="1"/>
-            <a:r>
-              <a:rPr lang="en-US" dirty="0"/>
-              <a:t>Why S&amp;P 500 ?</a:t>
-            </a:r>
-          </a:p>
-          <a:p>
-            <a:pPr lvl="1"/>
-            <a:r>
-              <a:rPr lang="en-US" b="0" i="0" dirty="0">
-                <a:solidFill>
-                  <a:srgbClr val="374151"/>
-                </a:solidFill>
-                <a:effectLst/>
-                <a:latin typeface="Söhne"/>
-              </a:rPr>
-              <a:t>Explain the motivation for the study</a:t>
-            </a:r>
-          </a:p>
-          <a:p>
-            <a:pPr algn="l">
-              <a:buFont typeface="+mj-lt"/>
-              <a:buAutoNum type="arabicPeriod"/>
-            </a:pPr>
-            <a:r>
-              <a:rPr lang="en-US" b="0" i="0" dirty="0">
-                <a:solidFill>
-                  <a:srgbClr val="374151"/>
-                </a:solidFill>
-                <a:effectLst/>
-                <a:latin typeface="Söhne"/>
-              </a:rPr>
-              <a:t>Data and Methodology:</a:t>
-            </a:r>
-          </a:p>
-          <a:p>
-            <a:pPr lvl="1"/>
-            <a:r>
-              <a:rPr lang="en-US" b="0" i="0" dirty="0">
-                <a:solidFill>
-                  <a:srgbClr val="374151"/>
-                </a:solidFill>
-                <a:effectLst/>
-                <a:latin typeface="Söhne"/>
-              </a:rPr>
-              <a:t>Describe the data sources used in the study</a:t>
-            </a:r>
-          </a:p>
-          <a:p>
-            <a:pPr lvl="1"/>
-            <a:r>
-              <a:rPr lang="en-US" b="0" i="0" dirty="0">
-                <a:solidFill>
-                  <a:srgbClr val="374151"/>
-                </a:solidFill>
-                <a:effectLst/>
-                <a:latin typeface="Söhne"/>
-              </a:rPr>
-              <a:t>Explain the methodology and analytical techniques employed</a:t>
-            </a:r>
-          </a:p>
-          <a:p>
-            <a:pPr algn="l">
-              <a:buFont typeface="+mj-lt"/>
-              <a:buAutoNum type="arabicPeriod"/>
-            </a:pPr>
-            <a:r>
-              <a:rPr lang="en-US" b="0" i="0" dirty="0">
-                <a:solidFill>
-                  <a:srgbClr val="374151"/>
-                </a:solidFill>
-                <a:effectLst/>
-                <a:latin typeface="Söhne"/>
-              </a:rPr>
-              <a:t>Industries:</a:t>
-            </a:r>
-          </a:p>
-          <a:p>
-            <a:pPr lvl="1"/>
             <a:r>
               <a:rPr lang="en-US" dirty="0">
                 <a:solidFill>
@@ -4532,12 +4790,13 @@
                 </a:solidFill>
                 <a:latin typeface="Söhne"/>
               </a:rPr>
-              <a:t>11 Sectors of </a:t>
-            </a:r>
-            <a:r>
-              <a:rPr lang="en-US" dirty="0"/>
-              <a:t>S&amp;P 500</a:t>
-            </a:r>
+              <a:t>We chose to Analyze the past 10 years of the S&amp;P500 to find:</a:t>
+            </a:r>
+          </a:p>
+          <a:p>
+            <a:pPr marL="0" indent="0" algn="l">
+              <a:buNone/>
+            </a:pPr>
             <a:endParaRPr lang="en-US" dirty="0">
               <a:solidFill>
                 <a:srgbClr val="374151"/>
@@ -4546,103 +4805,73 @@
             </a:endParaRPr>
           </a:p>
           <a:p>
-            <a:pPr lvl="1"/>
-            <a:r>
-              <a:rPr lang="en-US" b="0" i="0" dirty="0">
-                <a:solidFill>
-                  <a:srgbClr val="374151"/>
-                </a:solidFill>
+            <a:pPr marL="0" indent="0">
+              <a:buNone/>
+            </a:pPr>
+            <a:r>
+              <a:rPr lang="en-US" sz="1800" kern="100" dirty="0">
                 <a:effectLst/>
-                <a:latin typeface="Söhne"/>
-              </a:rPr>
-              <a:t>Se</a:t>
-            </a:r>
-            <a:r>
-              <a:rPr lang="en-US" dirty="0">
-                <a:solidFill>
-                  <a:srgbClr val="374151"/>
-                </a:solidFill>
-                <a:latin typeface="Söhne"/>
-              </a:rPr>
-              <a:t>ctors Weight analysis</a:t>
+                <a:latin typeface="Calibri" panose="020F0502020204030204" pitchFamily="34" charset="0"/>
+                <a:ea typeface="DengXian" panose="02010600030101010101" pitchFamily="2" charset="-122"/>
+                <a:cs typeface="Times New Roman" panose="02020603050405020304" pitchFamily="18" charset="0"/>
+              </a:rPr>
+              <a:t>Which sectors have experienced the most significant increase in stock prices over the past ten years?</a:t>
             </a:r>
           </a:p>
           <a:p>
             <a:pPr marL="0" indent="0">
               <a:buNone/>
             </a:pPr>
-            <a:r>
-              <a:rPr lang="en-US" b="0" i="0" dirty="0">
-                <a:solidFill>
-                  <a:srgbClr val="374151"/>
-                </a:solidFill>
+            <a:endParaRPr lang="en-US" sz="1800" kern="100" dirty="0">
+              <a:latin typeface="Calibri" panose="020F0502020204030204" pitchFamily="34" charset="0"/>
+              <a:ea typeface="DengXian" panose="02010600030101010101" pitchFamily="2" charset="-122"/>
+              <a:cs typeface="Times New Roman" panose="02020603050405020304" pitchFamily="18" charset="0"/>
+            </a:endParaRPr>
+          </a:p>
+          <a:p>
+            <a:pPr marL="0" indent="0">
+              <a:buNone/>
+            </a:pPr>
+            <a:r>
+              <a:rPr lang="en-US" sz="1800" kern="100" dirty="0">
                 <a:effectLst/>
-                <a:latin typeface="Söhne"/>
-              </a:rPr>
-              <a:t>4. Stock Price Performance</a:t>
-            </a:r>
-          </a:p>
-          <a:p>
-            <a:pPr lvl="1"/>
-            <a:r>
-              <a:rPr lang="en-US" dirty="0">
-                <a:solidFill>
-                  <a:srgbClr val="374151"/>
-                </a:solidFill>
-                <a:latin typeface="Söhne"/>
-              </a:rPr>
-              <a:t>10 Year Return Analysis</a:t>
+                <a:latin typeface="Calibri" panose="020F0502020204030204" pitchFamily="34" charset="0"/>
+                <a:ea typeface="DengXian" panose="02010600030101010101" pitchFamily="2" charset="-122"/>
+                <a:cs typeface="Times New Roman" panose="02020603050405020304" pitchFamily="18" charset="0"/>
+              </a:rPr>
+              <a:t>Which sectors have been the most stable in terms of stock price fluctuations over the past ten years?</a:t>
             </a:r>
           </a:p>
           <a:p>
             <a:pPr marL="0" indent="0">
               <a:buNone/>
             </a:pPr>
-            <a:r>
-              <a:rPr lang="en-US" dirty="0">
-                <a:solidFill>
-                  <a:srgbClr val="374151"/>
-                </a:solidFill>
-                <a:latin typeface="Söhne"/>
-              </a:rPr>
-              <a:t>5. </a:t>
-            </a:r>
-            <a:r>
-              <a:rPr lang="en-US" dirty="0"/>
-              <a:t>Industry Stability</a:t>
-            </a:r>
-          </a:p>
-          <a:p>
-            <a:pPr lvl="1">
-              <a:lnSpc>
-                <a:spcPct val="100000"/>
-              </a:lnSpc>
+            <a:endParaRPr lang="en-US" sz="1800" kern="100" dirty="0">
+              <a:effectLst/>
+              <a:latin typeface="Calibri" panose="020F0502020204030204" pitchFamily="34" charset="0"/>
+              <a:ea typeface="DengXian" panose="02010600030101010101" pitchFamily="2" charset="-122"/>
+              <a:cs typeface="Times New Roman" panose="02020603050405020304" pitchFamily="18" charset="0"/>
+            </a:endParaRPr>
+          </a:p>
+          <a:p>
+            <a:pPr marL="0" indent="0">
+              <a:buNone/>
             </a:pPr>
             <a:r>
-              <a:rPr lang="en-US" dirty="0">
-                <a:solidFill>
-                  <a:srgbClr val="374151"/>
-                </a:solidFill>
-                <a:latin typeface="Söhne"/>
-              </a:rPr>
-              <a:t>Yearly Return Analysis</a:t>
-            </a:r>
-          </a:p>
-          <a:p>
-            <a:pPr lvl="1">
-              <a:lnSpc>
-                <a:spcPct val="100000"/>
-              </a:lnSpc>
-            </a:pPr>
-            <a:r>
-              <a:rPr lang="en-US" dirty="0">
-                <a:solidFill>
-                  <a:srgbClr val="374151"/>
-                </a:solidFill>
-                <a:latin typeface="Söhne"/>
-              </a:rPr>
-              <a:t>Yearly Moving Analysis </a:t>
-            </a:r>
+              <a:rPr lang="en-US" sz="1800" kern="100" dirty="0">
+                <a:effectLst/>
+                <a:latin typeface="Calibri" panose="020F0502020204030204" pitchFamily="34" charset="0"/>
+                <a:ea typeface="DengXian" panose="02010600030101010101" pitchFamily="2" charset="-122"/>
+                <a:cs typeface="Times New Roman" panose="02020603050405020304" pitchFamily="18" charset="0"/>
+              </a:rPr>
+              <a:t>Which sectors would be best for investors, given the historical data and our analysis?</a:t>
+            </a:r>
+            <a:endParaRPr lang="en-US" dirty="0">
+              <a:solidFill>
+                <a:srgbClr val="374151"/>
+              </a:solidFill>
+              <a:latin typeface="Söhne"/>
+            </a:endParaRPr>
           </a:p>
         </p:txBody>
       </p:sp>
@@ -4681,7 +4910,7 @@
           <p:cNvPr id="2" name="Title 1">
             <a:extLst>
               <a:ext uri="{FF2B5EF4-FFF2-40B4-BE49-F238E27FC236}">
-                <a16:creationId xmlns:a16="http://schemas.microsoft.com/office/drawing/2014/main" id="{6C67EDA2-1B92-E3D8-4DE8-2FE5F5897D7A}"/>
+                <a16:creationId xmlns:a16="http://schemas.microsoft.com/office/drawing/2014/main" id="{FEEAC4ED-AFAE-F26B-5DDE-02930D8F5EE3}"/>
               </a:ext>
             </a:extLst>
           </p:cNvPr>
@@ -4690,14 +4919,112 @@
           </p:cNvSpPr>
           <p:nvPr>
             <p:ph type="title"/>
+          </p:nvPr>
+        </p:nvSpPr>
+        <p:spPr/>
+        <p:txBody>
+          <a:bodyPr/>
+          <a:lstStyle/>
+          <a:p>
+            <a:r>
+              <a:rPr lang="en-US" dirty="0"/>
+              <a:t>S&amp;P 500</a:t>
+            </a:r>
+          </a:p>
+        </p:txBody>
+      </p:sp>
+      <p:sp>
+        <p:nvSpPr>
+          <p:cNvPr id="3" name="Content Placeholder 2">
+            <a:extLst>
+              <a:ext uri="{FF2B5EF4-FFF2-40B4-BE49-F238E27FC236}">
+                <a16:creationId xmlns:a16="http://schemas.microsoft.com/office/drawing/2014/main" id="{88F34932-19B3-572A-0A8D-BA88EAF68EFB}"/>
+              </a:ext>
+            </a:extLst>
+          </p:cNvPr>
+          <p:cNvSpPr>
+            <a:spLocks noGrp="1"/>
+          </p:cNvSpPr>
+          <p:nvPr>
+            <p:ph idx="1"/>
           </p:nvPr>
         </p:nvSpPr>
         <p:spPr>
           <a:xfrm>
-            <a:off x="758301" y="296100"/>
-            <a:ext cx="10515600" cy="1325563"/>
+            <a:off x="838200" y="1489959"/>
+            <a:ext cx="10515600" cy="4351338"/>
           </a:xfrm>
         </p:spPr>
+        <p:txBody>
+          <a:bodyPr/>
+          <a:lstStyle/>
+          <a:p>
+            <a:r>
+              <a:rPr lang="en-US" dirty="0"/>
+              <a:t>The S&amp;P 500, or Standard &amp; Poor's 500, is a widely-followed stock market index that represents the performance of 500 large-cap U.S. companies listed on the New York Stock Exchange (NYSE) or the Nasdaq. </a:t>
+            </a:r>
+          </a:p>
+          <a:p>
+            <a:r>
+              <a:rPr lang="en-US" dirty="0"/>
+              <a:t>The S&amp;P 500 is considered a benchmark for the overall U.S. stock market and a reliable indicator of the U.S. economy's health.</a:t>
+            </a:r>
+          </a:p>
+          <a:p>
+            <a:r>
+              <a:rPr lang="en-US" dirty="0"/>
+              <a:t>We decided to use the S&amp;P 500 because the growth of the stocks in the S&amp;P correlates closely with the growth of the market as a whole</a:t>
+            </a:r>
+          </a:p>
+        </p:txBody>
+      </p:sp>
+    </p:spTree>
+    <p:extLst>
+      <p:ext uri="{BB962C8B-B14F-4D97-AF65-F5344CB8AC3E}">
+        <p14:creationId xmlns:p14="http://schemas.microsoft.com/office/powerpoint/2010/main" val="48178651"/>
+      </p:ext>
+    </p:extLst>
+  </p:cSld>
+  <p:clrMapOvr>
+    <a:masterClrMapping/>
+  </p:clrMapOvr>
+</p:sld>
+</file>
+
+<file path=ppt/slides/slide4.xml><?xml version="1.0" encoding="utf-8"?>
+<p:sld xmlns:a="http://schemas.openxmlformats.org/drawingml/2006/main" xmlns:r="http://schemas.openxmlformats.org/officeDocument/2006/relationships" xmlns:p="http://schemas.openxmlformats.org/presentationml/2006/main">
+  <p:cSld>
+    <p:spTree>
+      <p:nvGrpSpPr>
+        <p:cNvPr id="1" name=""/>
+        <p:cNvGrpSpPr/>
+        <p:nvPr/>
+      </p:nvGrpSpPr>
+      <p:grpSpPr>
+        <a:xfrm>
+          <a:off x="0" y="0"/>
+          <a:ext cx="0" cy="0"/>
+          <a:chOff x="0" y="0"/>
+          <a:chExt cx="0" cy="0"/>
+        </a:xfrm>
+      </p:grpSpPr>
+      <p:sp>
+        <p:nvSpPr>
+          <p:cNvPr id="2" name="Title 1">
+            <a:extLst>
+              <a:ext uri="{FF2B5EF4-FFF2-40B4-BE49-F238E27FC236}">
+                <a16:creationId xmlns:a16="http://schemas.microsoft.com/office/drawing/2014/main" id="{6C67EDA2-1B92-E3D8-4DE8-2FE5F5897D7A}"/>
+              </a:ext>
+            </a:extLst>
+          </p:cNvPr>
+          <p:cNvSpPr>
+            <a:spLocks noGrp="1"/>
+          </p:cNvSpPr>
+          <p:nvPr>
+            <p:ph type="title"/>
+          </p:nvPr>
+        </p:nvSpPr>
+        <p:spPr/>
         <p:txBody>
           <a:bodyPr/>
           <a:lstStyle/>
@@ -4748,7 +5075,9 @@
           </a:xfrm>
         </p:spPr>
         <p:txBody>
-          <a:bodyPr/>
+          <a:bodyPr>
+            <a:normAutofit/>
+          </a:bodyPr>
           <a:lstStyle/>
           <a:p>
             <a:r>
@@ -4766,6 +5095,19 @@
             <a:endParaRPr lang="en-US" dirty="0"/>
           </a:p>
           <a:p>
+            <a:r>
+              <a:rPr lang="en-US" dirty="0"/>
+              <a:t>S&amp;P 500 Data</a:t>
+            </a:r>
+          </a:p>
+          <a:p>
+            <a:pPr lvl="1"/>
+            <a:r>
+              <a:rPr lang="en-US" dirty="0">
+                <a:hlinkClick r:id="rId2"/>
+              </a:rPr>
+              <a:t>https://www.ssga.com/us/en/intermediary/etfs/funds/spdr-sp-500-etf-trust-spy#holdings</a:t>
+            </a:r>
             <a:endParaRPr lang="en-US" dirty="0"/>
           </a:p>
           <a:p>
@@ -4777,9 +5119,16 @@
           <a:p>
             <a:pPr lvl="1"/>
             <a:r>
-              <a:rPr lang="en-US" dirty="0"/>
+              <a:rPr lang="en-US" dirty="0">
+                <a:hlinkClick r:id="rId3"/>
+              </a:rPr>
               <a:t>https://www.stockdata.org/</a:t>
             </a:r>
+            <a:endParaRPr lang="en-US" dirty="0"/>
+          </a:p>
+          <a:p>
+            <a:pPr lvl="1"/>
+            <a:endParaRPr lang="en-US" dirty="0"/>
           </a:p>
         </p:txBody>
       </p:sp>
@@ -4798,7 +5147,7 @@
           <p:nvPr/>
         </p:nvPicPr>
         <p:blipFill>
-          <a:blip r:embed="rId2"/>
+          <a:blip r:embed="rId4"/>
           <a:stretch>
             <a:fillRect/>
           </a:stretch>
@@ -4826,97 +5175,6 @@
 </p:sld>
 </file>
 
-<file path=ppt/slides/slide4.xml><?xml version="1.0" encoding="utf-8"?>
-<p:sld xmlns:a="http://schemas.openxmlformats.org/drawingml/2006/main" xmlns:r="http://schemas.openxmlformats.org/officeDocument/2006/relationships" xmlns:p="http://schemas.openxmlformats.org/presentationml/2006/main">
-  <p:cSld>
-    <p:spTree>
-      <p:nvGrpSpPr>
-        <p:cNvPr id="1" name=""/>
-        <p:cNvGrpSpPr/>
-        <p:nvPr/>
-      </p:nvGrpSpPr>
-      <p:grpSpPr>
-        <a:xfrm>
-          <a:off x="0" y="0"/>
-          <a:ext cx="0" cy="0"/>
-          <a:chOff x="0" y="0"/>
-          <a:chExt cx="0" cy="0"/>
-        </a:xfrm>
-      </p:grpSpPr>
-      <p:sp>
-        <p:nvSpPr>
-          <p:cNvPr id="2" name="Title 1">
-            <a:extLst>
-              <a:ext uri="{FF2B5EF4-FFF2-40B4-BE49-F238E27FC236}">
-                <a16:creationId xmlns:a16="http://schemas.microsoft.com/office/drawing/2014/main" id="{FEEAC4ED-AFAE-F26B-5DDE-02930D8F5EE3}"/>
-              </a:ext>
-            </a:extLst>
-          </p:cNvPr>
-          <p:cNvSpPr>
-            <a:spLocks noGrp="1"/>
-          </p:cNvSpPr>
-          <p:nvPr>
-            <p:ph type="title"/>
-          </p:nvPr>
-        </p:nvSpPr>
-        <p:spPr/>
-        <p:txBody>
-          <a:bodyPr/>
-          <a:lstStyle/>
-          <a:p>
-            <a:r>
-              <a:rPr lang="en-US" dirty="0"/>
-              <a:t>S&amp;P 500</a:t>
-            </a:r>
-          </a:p>
-        </p:txBody>
-      </p:sp>
-      <p:sp>
-        <p:nvSpPr>
-          <p:cNvPr id="3" name="Content Placeholder 2">
-            <a:extLst>
-              <a:ext uri="{FF2B5EF4-FFF2-40B4-BE49-F238E27FC236}">
-                <a16:creationId xmlns:a16="http://schemas.microsoft.com/office/drawing/2014/main" id="{88F34932-19B3-572A-0A8D-BA88EAF68EFB}"/>
-              </a:ext>
-            </a:extLst>
-          </p:cNvPr>
-          <p:cNvSpPr>
-            <a:spLocks noGrp="1"/>
-          </p:cNvSpPr>
-          <p:nvPr>
-            <p:ph idx="1"/>
-          </p:nvPr>
-        </p:nvSpPr>
-        <p:spPr>
-          <a:xfrm>
-            <a:off x="838200" y="1489959"/>
-            <a:ext cx="10515600" cy="4351338"/>
-          </a:xfrm>
-        </p:spPr>
-        <p:txBody>
-          <a:bodyPr/>
-          <a:lstStyle/>
-          <a:p>
-            <a:r>
-              <a:rPr lang="en-US" dirty="0"/>
-              <a:t>The S&amp;P 500, or Standard &amp; Poor's 500, is a widely-followed stock market index that represents the performance of 500 large-cap U.S. companies listed on the New York Stock Exchange (NYSE) or the Nasdaq. The S&amp;P 500 is considered a benchmark for the overall U.S. stock market and a reliable indicator of the U.S. economy's health.</a:t>
-            </a:r>
-          </a:p>
-        </p:txBody>
-      </p:sp>
-    </p:spTree>
-    <p:extLst>
-      <p:ext uri="{BB962C8B-B14F-4D97-AF65-F5344CB8AC3E}">
-        <p14:creationId xmlns:p14="http://schemas.microsoft.com/office/powerpoint/2010/main" val="48178651"/>
-      </p:ext>
-    </p:extLst>
-  </p:cSld>
-  <p:clrMapOvr>
-    <a:masterClrMapping/>
-  </p:clrMapOvr>
-</p:sld>
-</file>
-
 <file path=ppt/slides/slide5.xml><?xml version="1.0" encoding="utf-8"?>
 <p:sld xmlns:a="http://schemas.openxmlformats.org/drawingml/2006/main" xmlns:r="http://schemas.openxmlformats.org/officeDocument/2006/relationships" xmlns:p="http://schemas.openxmlformats.org/presentationml/2006/main">
   <p:cSld>
@@ -5028,7 +5286,7 @@
         </p:blipFill>
         <p:spPr bwMode="auto">
           <a:xfrm>
-            <a:off x="465660" y="2395959"/>
+            <a:off x="224741" y="1889897"/>
             <a:ext cx="5819775" cy="3895725"/>
           </a:xfrm>
           <a:prstGeom prst="rect">
@@ -5068,7 +5326,7 @@
         </p:blipFill>
         <p:spPr>
           <a:xfrm>
-            <a:off x="6367411" y="2464059"/>
+            <a:off x="6367411" y="2128393"/>
             <a:ext cx="5358929" cy="3759523"/>
           </a:xfrm>
           <a:prstGeom prst="rect">
@@ -5132,6 +5390,79 @@
               <a:t>, each representing a specific industry group within the U.S. economy. These sectors are defined by the Global Industry Classification Standard (GICS), a system developed by MSCI and S&amp;P Global. </a:t>
             </a:r>
             <a:endParaRPr lang="en-US" dirty="0"/>
+          </a:p>
+        </p:txBody>
+      </p:sp>
+      <p:sp>
+        <p:nvSpPr>
+          <p:cNvPr id="3" name="TextBox 2">
+            <a:extLst>
+              <a:ext uri="{FF2B5EF4-FFF2-40B4-BE49-F238E27FC236}">
+                <a16:creationId xmlns:a16="http://schemas.microsoft.com/office/drawing/2014/main" id="{24D4A626-2586-51C8-CD8C-329447DF165E}"/>
+              </a:ext>
+            </a:extLst>
+          </p:cNvPr>
+          <p:cNvSpPr txBox="1"/>
+          <p:nvPr/>
+        </p:nvSpPr>
+        <p:spPr>
+          <a:xfrm>
+            <a:off x="138896" y="5862707"/>
+            <a:ext cx="11587444" cy="584775"/>
+          </a:xfrm>
+          <a:prstGeom prst="rect">
+            <a:avLst/>
+          </a:prstGeom>
+          <a:noFill/>
+        </p:spPr>
+        <p:txBody>
+          <a:bodyPr wrap="square" rtlCol="0">
+            <a:spAutoFit/>
+          </a:bodyPr>
+          <a:lstStyle/>
+          <a:p>
+            <a:r>
+              <a:rPr lang="en-US" sz="1400" dirty="0"/>
+              <a:t>The S&amp;P 500 scales its holdings based on the market caps of each company in its fund. So more valuable companies get more representation within the fund. </a:t>
+            </a:r>
+          </a:p>
+          <a:p>
+            <a:endParaRPr lang="en-US" dirty="0"/>
+          </a:p>
+        </p:txBody>
+      </p:sp>
+      <p:sp>
+        <p:nvSpPr>
+          <p:cNvPr id="5" name="TextBox 4">
+            <a:extLst>
+              <a:ext uri="{FF2B5EF4-FFF2-40B4-BE49-F238E27FC236}">
+                <a16:creationId xmlns:a16="http://schemas.microsoft.com/office/drawing/2014/main" id="{9F750359-130F-EF24-B469-A745878D9B3B}"/>
+              </a:ext>
+            </a:extLst>
+          </p:cNvPr>
+          <p:cNvSpPr txBox="1"/>
+          <p:nvPr/>
+        </p:nvSpPr>
+        <p:spPr>
+          <a:xfrm>
+            <a:off x="224741" y="6288167"/>
+            <a:ext cx="10688119" cy="369332"/>
+          </a:xfrm>
+          <a:prstGeom prst="rect">
+            <a:avLst/>
+          </a:prstGeom>
+          <a:noFill/>
+        </p:spPr>
+        <p:txBody>
+          <a:bodyPr wrap="none" rtlCol="0">
+            <a:spAutoFit/>
+          </a:bodyPr>
+          <a:lstStyle/>
+          <a:p>
+            <a:r>
+              <a:rPr lang="en-US" dirty="0"/>
+              <a:t>Information Technology is the biggest industry right now, so its obviously very highly represented in the S&amp;P 500</a:t>
+            </a:r>
           </a:p>
         </p:txBody>
       </p:sp>
@@ -5187,8 +5518,8 @@
         </p:blipFill>
         <p:spPr>
           <a:xfrm>
-            <a:off x="0" y="1468502"/>
-            <a:ext cx="12192000" cy="4572000"/>
+            <a:off x="0" y="1544810"/>
+            <a:ext cx="12192000" cy="4272541"/>
           </a:xfrm>
           <a:prstGeom prst="rect">
             <a:avLst/>
@@ -5211,7 +5542,7 @@
         </p:nvSpPr>
         <p:spPr bwMode="auto">
           <a:xfrm>
-            <a:off x="192024" y="1283836"/>
+            <a:off x="192024" y="1224678"/>
             <a:ext cx="12886481" cy="184666"/>
           </a:xfrm>
           <a:prstGeom prst="rect">
@@ -5628,6 +5959,41 @@
           </a:p>
         </p:txBody>
       </p:sp>
+      <p:sp>
+        <p:nvSpPr>
+          <p:cNvPr id="6" name="TextBox 5">
+            <a:extLst>
+              <a:ext uri="{FF2B5EF4-FFF2-40B4-BE49-F238E27FC236}">
+                <a16:creationId xmlns:a16="http://schemas.microsoft.com/office/drawing/2014/main" id="{FC6980E8-C671-C87C-3BC3-5B9AD42E6FB7}"/>
+              </a:ext>
+            </a:extLst>
+          </p:cNvPr>
+          <p:cNvSpPr txBox="1"/>
+          <p:nvPr/>
+        </p:nvSpPr>
+        <p:spPr>
+          <a:xfrm>
+            <a:off x="181881" y="6272950"/>
+            <a:ext cx="11828238" cy="369332"/>
+          </a:xfrm>
+          <a:prstGeom prst="rect">
+            <a:avLst/>
+          </a:prstGeom>
+          <a:noFill/>
+        </p:spPr>
+        <p:txBody>
+          <a:bodyPr wrap="none" rtlCol="0">
+            <a:spAutoFit/>
+          </a:bodyPr>
+          <a:lstStyle/>
+          <a:p>
+            <a:r>
+              <a:rPr lang="en-US" dirty="0"/>
+              <a:t>Here’s a quick breakdown of the most represented companies from each sector and their relative weight within the S&amp;P 500</a:t>
+            </a:r>
+          </a:p>
+        </p:txBody>
+      </p:sp>
     </p:spTree>
     <p:extLst>
       <p:ext uri="{BB962C8B-B14F-4D97-AF65-F5344CB8AC3E}">
@@ -5813,12 +6179,7 @@
             <p:ph type="title"/>
           </p:nvPr>
         </p:nvSpPr>
-        <p:spPr>
-          <a:xfrm>
-            <a:off x="207885" y="246038"/>
-            <a:ext cx="10515600" cy="1325563"/>
-          </a:xfrm>
-        </p:spPr>
+        <p:spPr/>
         <p:txBody>
           <a:bodyPr/>
           <a:lstStyle/>
@@ -5861,7 +6222,7 @@
         </p:blipFill>
         <p:spPr bwMode="auto">
           <a:xfrm>
-            <a:off x="578766" y="3334161"/>
+            <a:off x="6842760" y="975360"/>
             <a:ext cx="4886919" cy="4881563"/>
           </a:xfrm>
           <a:prstGeom prst="rect">
@@ -5893,7 +6254,7 @@
         </p:nvSpPr>
         <p:spPr>
           <a:xfrm>
-            <a:off x="462321" y="1407694"/>
+            <a:off x="462321" y="1798320"/>
             <a:ext cx="5481279" cy="923330"/>
           </a:xfrm>
           <a:prstGeom prst="rect">
@@ -5914,71 +6275,6 @@
           </a:p>
         </p:txBody>
       </p:sp>
-      <p:sp>
-        <p:nvSpPr>
-          <p:cNvPr id="7" name="TextBox 6">
-            <a:extLst>
-              <a:ext uri="{FF2B5EF4-FFF2-40B4-BE49-F238E27FC236}">
-                <a16:creationId xmlns:a16="http://schemas.microsoft.com/office/drawing/2014/main" id="{1C407A35-1E91-0739-B65D-A2E0B23F3B16}"/>
-              </a:ext>
-            </a:extLst>
-          </p:cNvPr>
-          <p:cNvSpPr txBox="1"/>
-          <p:nvPr/>
-        </p:nvSpPr>
-        <p:spPr>
-          <a:xfrm>
-            <a:off x="462322" y="2509427"/>
-            <a:ext cx="5481278" cy="646331"/>
-          </a:xfrm>
-          <a:prstGeom prst="rect">
-            <a:avLst/>
-          </a:prstGeom>
-          <a:noFill/>
-        </p:spPr>
-        <p:txBody>
-          <a:bodyPr wrap="square" rtlCol="0">
-            <a:spAutoFit/>
-          </a:bodyPr>
-          <a:lstStyle/>
-          <a:p>
-            <a:r>
-              <a:rPr lang="en-US" dirty="0"/>
-              <a:t>We don’t have exact data on volatility but, as shown in the previous slide, IT tends to be the most volatile</a:t>
-            </a:r>
-          </a:p>
-        </p:txBody>
-      </p:sp>
-      <p:pic>
-        <p:nvPicPr>
-          <p:cNvPr id="3" name="Picture 2">
-            <a:extLst>
-              <a:ext uri="{FF2B5EF4-FFF2-40B4-BE49-F238E27FC236}">
-                <a16:creationId xmlns:a16="http://schemas.microsoft.com/office/drawing/2014/main" id="{CCB58E84-150A-E04D-790A-284AED4D3117}"/>
-              </a:ext>
-            </a:extLst>
-          </p:cNvPr>
-          <p:cNvPicPr>
-            <a:picLocks noChangeAspect="1"/>
-          </p:cNvPicPr>
-          <p:nvPr/>
-        </p:nvPicPr>
-        <p:blipFill>
-          <a:blip r:embed="rId3"/>
-          <a:stretch>
-            <a:fillRect/>
-          </a:stretch>
-        </p:blipFill>
-        <p:spPr>
-          <a:xfrm>
-            <a:off x="5943600" y="568488"/>
-            <a:ext cx="5765128" cy="5831489"/>
-          </a:xfrm>
-          <a:prstGeom prst="rect">
-            <a:avLst/>
-          </a:prstGeom>
-        </p:spPr>
-      </p:pic>
     </p:spTree>
     <p:extLst>
       <p:ext uri="{BB962C8B-B14F-4D97-AF65-F5344CB8AC3E}">
@@ -6038,7 +6334,7 @@
           <a:lstStyle/>
           <a:p>
             <a:r>
-              <a:rPr lang="en-US" sz="3600" b="1" dirty="0"/>
+              <a:rPr lang="en-US" sz="3200" dirty="0"/>
               <a:t>Top Returned Stocks (2013-2022)</a:t>
             </a:r>
           </a:p>
@@ -6118,7 +6414,7 @@
         </p:nvSpPr>
         <p:spPr>
           <a:xfrm>
-            <a:off x="323088" y="1004281"/>
+            <a:off x="323088" y="1137446"/>
             <a:ext cx="2991525" cy="1323439"/>
           </a:xfrm>
           <a:prstGeom prst="rect">
@@ -6133,28 +6429,19 @@
           <a:lstStyle/>
           <a:p>
             <a:r>
-              <a:rPr lang="en-US" sz="2000" dirty="0">
-                <a:latin typeface="Arial" panose="020B0604020202020204" pitchFamily="34" charset="0"/>
-                <a:cs typeface="Arial" panose="020B0604020202020204" pitchFamily="34" charset="0"/>
-              </a:rPr>
+              <a:rPr lang="en-US" sz="2000" dirty="0"/>
               <a:t>Top 1</a:t>
             </a:r>
           </a:p>
           <a:p>
             <a:r>
-              <a:rPr lang="en-US" sz="2000" dirty="0">
-                <a:latin typeface="Arial" panose="020B0604020202020204" pitchFamily="34" charset="0"/>
-                <a:cs typeface="Arial" panose="020B0604020202020204" pitchFamily="34" charset="0"/>
-              </a:rPr>
+              <a:rPr lang="en-US" sz="2000" dirty="0"/>
               <a:t>Enphase Energy Inc.</a:t>
             </a:r>
           </a:p>
           <a:p>
             <a:r>
-              <a:rPr lang="en-US" sz="2000" dirty="0">
-                <a:latin typeface="Arial" panose="020B0604020202020204" pitchFamily="34" charset="0"/>
-                <a:cs typeface="Arial" panose="020B0604020202020204" pitchFamily="34" charset="0"/>
-              </a:rPr>
+              <a:rPr lang="en-US" sz="2000" dirty="0"/>
               <a:t>2013-01-04 : </a:t>
             </a:r>
             <a:r>
@@ -6163,8 +6450,7 @@
                   <a:srgbClr val="000000"/>
                 </a:solidFill>
                 <a:effectLst/>
-                <a:latin typeface="Arial" panose="020B0604020202020204" pitchFamily="34" charset="0"/>
-                <a:cs typeface="Arial" panose="020B0604020202020204" pitchFamily="34" charset="0"/>
+                <a:latin typeface="Helvetica Neue"/>
               </a:rPr>
               <a:t>3.87</a:t>
             </a:r>
@@ -6175,8 +6461,7 @@
                 <a:solidFill>
                   <a:srgbClr val="000000"/>
                 </a:solidFill>
-                <a:latin typeface="Arial" panose="020B0604020202020204" pitchFamily="34" charset="0"/>
-                <a:cs typeface="Arial" panose="020B0604020202020204" pitchFamily="34" charset="0"/>
+                <a:latin typeface="Helvetica Neue"/>
               </a:rPr>
               <a:t>2022-12-30: </a:t>
             </a:r>
@@ -6186,8 +6471,7 @@
                   <a:srgbClr val="000000"/>
                 </a:solidFill>
                 <a:effectLst/>
-                <a:latin typeface="Arial" panose="020B0604020202020204" pitchFamily="34" charset="0"/>
-                <a:cs typeface="Arial" panose="020B0604020202020204" pitchFamily="34" charset="0"/>
+                <a:latin typeface="Helvetica Neue"/>
               </a:rPr>
               <a:t>264.959991</a:t>
             </a:r>

</xml_diff>